<commit_message>
remove : duplicate slide deck
</commit_message>
<xml_diff>
--- a/slides/2018-fall/zhengzhong_reading_group.pptx
+++ b/slides/2018-fall/zhengzhong_reading_group.pptx
@@ -253,7 +253,7 @@
           <a:p>
             <a:fld id="{F4E13547-85FE-4DE6-BAD0-1F83419733E7}" type="datetimeFigureOut">
               <a:rPr lang="en-US" smtClean="0"/>
-              <a:t>10/19/2018</a:t>
+              <a:t>10/30/2018</a:t>
             </a:fld>
             <a:endParaRPr lang="en-US"/>
           </a:p>
@@ -423,7 +423,7 @@
           <a:p>
             <a:fld id="{F4E13547-85FE-4DE6-BAD0-1F83419733E7}" type="datetimeFigureOut">
               <a:rPr lang="en-US" smtClean="0"/>
-              <a:t>10/19/2018</a:t>
+              <a:t>10/30/2018</a:t>
             </a:fld>
             <a:endParaRPr lang="en-US"/>
           </a:p>
@@ -603,7 +603,7 @@
           <a:p>
             <a:fld id="{F4E13547-85FE-4DE6-BAD0-1F83419733E7}" type="datetimeFigureOut">
               <a:rPr lang="en-US" smtClean="0"/>
-              <a:t>10/19/2018</a:t>
+              <a:t>10/30/2018</a:t>
             </a:fld>
             <a:endParaRPr lang="en-US"/>
           </a:p>
@@ -773,7 +773,7 @@
           <a:p>
             <a:fld id="{F4E13547-85FE-4DE6-BAD0-1F83419733E7}" type="datetimeFigureOut">
               <a:rPr lang="en-US" smtClean="0"/>
-              <a:t>10/19/2018</a:t>
+              <a:t>10/30/2018</a:t>
             </a:fld>
             <a:endParaRPr lang="en-US"/>
           </a:p>
@@ -1019,7 +1019,7 @@
           <a:p>
             <a:fld id="{F4E13547-85FE-4DE6-BAD0-1F83419733E7}" type="datetimeFigureOut">
               <a:rPr lang="en-US" smtClean="0"/>
-              <a:t>10/19/2018</a:t>
+              <a:t>10/30/2018</a:t>
             </a:fld>
             <a:endParaRPr lang="en-US"/>
           </a:p>
@@ -1251,7 +1251,7 @@
           <a:p>
             <a:fld id="{F4E13547-85FE-4DE6-BAD0-1F83419733E7}" type="datetimeFigureOut">
               <a:rPr lang="en-US" smtClean="0"/>
-              <a:t>10/19/2018</a:t>
+              <a:t>10/30/2018</a:t>
             </a:fld>
             <a:endParaRPr lang="en-US"/>
           </a:p>
@@ -1618,7 +1618,7 @@
           <a:p>
             <a:fld id="{F4E13547-85FE-4DE6-BAD0-1F83419733E7}" type="datetimeFigureOut">
               <a:rPr lang="en-US" smtClean="0"/>
-              <a:t>10/19/2018</a:t>
+              <a:t>10/30/2018</a:t>
             </a:fld>
             <a:endParaRPr lang="en-US"/>
           </a:p>
@@ -1736,7 +1736,7 @@
           <a:p>
             <a:fld id="{F4E13547-85FE-4DE6-BAD0-1F83419733E7}" type="datetimeFigureOut">
               <a:rPr lang="en-US" smtClean="0"/>
-              <a:t>10/19/2018</a:t>
+              <a:t>10/30/2018</a:t>
             </a:fld>
             <a:endParaRPr lang="en-US"/>
           </a:p>
@@ -1831,7 +1831,7 @@
           <a:p>
             <a:fld id="{F4E13547-85FE-4DE6-BAD0-1F83419733E7}" type="datetimeFigureOut">
               <a:rPr lang="en-US" smtClean="0"/>
-              <a:t>10/19/2018</a:t>
+              <a:t>10/30/2018</a:t>
             </a:fld>
             <a:endParaRPr lang="en-US"/>
           </a:p>
@@ -2108,7 +2108,7 @@
           <a:p>
             <a:fld id="{F4E13547-85FE-4DE6-BAD0-1F83419733E7}" type="datetimeFigureOut">
               <a:rPr lang="en-US" smtClean="0"/>
-              <a:t>10/19/2018</a:t>
+              <a:t>10/30/2018</a:t>
             </a:fld>
             <a:endParaRPr lang="en-US"/>
           </a:p>
@@ -2361,7 +2361,7 @@
           <a:p>
             <a:fld id="{F4E13547-85FE-4DE6-BAD0-1F83419733E7}" type="datetimeFigureOut">
               <a:rPr lang="en-US" smtClean="0"/>
-              <a:t>10/19/2018</a:t>
+              <a:t>10/30/2018</a:t>
             </a:fld>
             <a:endParaRPr lang="en-US"/>
           </a:p>
@@ -2574,7 +2574,7 @@
           <a:p>
             <a:fld id="{F4E13547-85FE-4DE6-BAD0-1F83419733E7}" type="datetimeFigureOut">
               <a:rPr lang="en-US" smtClean="0"/>
-              <a:t>10/19/2018</a:t>
+              <a:t>10/30/2018</a:t>
             </a:fld>
             <a:endParaRPr lang="en-US"/>
           </a:p>
@@ -4455,8 +4455,8 @@
         </p:nvSpPr>
         <p:spPr>
           <a:xfrm>
-            <a:off x="5417093" y="812800"/>
-            <a:ext cx="4432300" cy="5632311"/>
+            <a:off x="4392540" y="955381"/>
+            <a:ext cx="5456853" cy="5632311"/>
           </a:xfrm>
           <a:prstGeom prst="rect">
             <a:avLst/>
@@ -4475,7 +4475,7 @@
             </a:pPr>
             <a:r>
               <a:rPr lang="en-US" dirty="0"/>
-              <a:t>Context before 20: order of tokens are important (shuffling causes huge loss).</a:t>
+              <a:t>Context before 20: order of tokens are important (shuffling causes huge loss). (Section 5.1)</a:t>
             </a:r>
           </a:p>
           <a:p>
@@ -4492,7 +4492,7 @@
             </a:pPr>
             <a:r>
               <a:rPr lang="en-US" dirty="0"/>
-              <a:t>Context before 50: LSTM without cache may copy word from such context to generate target.</a:t>
+              <a:t>Context before 50: LSTM without cache may copy word from such context to generate target. (Section and 6.1)</a:t>
             </a:r>
           </a:p>
           <a:p>
@@ -4509,7 +4509,7 @@
             </a:pPr>
             <a:r>
               <a:rPr lang="en-US" dirty="0"/>
-              <a:t>Context from 20 to 200: order of tokens is not important, but the show up of relevant words is important</a:t>
+              <a:t>Context from 20 to 200: order of tokens is not important, but the show up of relevant words is important. (Section 5.1)</a:t>
             </a:r>
           </a:p>
           <a:p>
@@ -4526,7 +4526,7 @@
             </a:pPr>
             <a:r>
               <a:rPr lang="en-US" dirty="0"/>
-              <a:t>Context before ~200: effective size of LSTM language model without cache. </a:t>
+              <a:t>Context before ~200: effective size of LSTM language model without cache. (Section 4)</a:t>
             </a:r>
           </a:p>
           <a:p>
@@ -4543,7 +4543,7 @@
             </a:pPr>
             <a:r>
               <a:rPr lang="en-US" dirty="0"/>
-              <a:t>Context from 50 to 300: only a rough semantic context is maintained.</a:t>
+              <a:t>Context from 50 to 300: only a rough semantic context is maintained. (Section 6.1)</a:t>
             </a:r>
           </a:p>
           <a:p>
@@ -4560,7 +4560,7 @@
             </a:pPr>
             <a:r>
               <a:rPr lang="en-US" dirty="0"/>
-              <a:t>Context between 200~3750: cache can help LSTM language model to retrieve information from the history. </a:t>
+              <a:t>Context between 200~3750: cache can help LSTM language model to retrieve information from the history. (Section 6.2)</a:t>
             </a:r>
           </a:p>
         </p:txBody>

</xml_diff>